<commit_message>
Chapter 1 finished. Chapter 2 started.
Chapter 1 finished. Chapter 2 started.
</commit_message>
<xml_diff>
--- a/figures/speed_triangles_1.pptx
+++ b/figures/speed_triangles_1.pptx
@@ -259,7 +259,7 @@
           <a:p>
             <a:fld id="{A6E2C317-66DB-4326-8236-4682C01F4A41}" type="datetimeFigureOut">
               <a:rPr lang="en-US" smtClean="0"/>
-              <a:t>10-Mar-19</a:t>
+              <a:t>3/17/2019</a:t>
             </a:fld>
             <a:endParaRPr lang="en-US"/>
           </a:p>
@@ -457,7 +457,7 @@
           <a:p>
             <a:fld id="{A6E2C317-66DB-4326-8236-4682C01F4A41}" type="datetimeFigureOut">
               <a:rPr lang="en-US" smtClean="0"/>
-              <a:t>10-Mar-19</a:t>
+              <a:t>3/17/2019</a:t>
             </a:fld>
             <a:endParaRPr lang="en-US"/>
           </a:p>
@@ -665,7 +665,7 @@
           <a:p>
             <a:fld id="{A6E2C317-66DB-4326-8236-4682C01F4A41}" type="datetimeFigureOut">
               <a:rPr lang="en-US" smtClean="0"/>
-              <a:t>10-Mar-19</a:t>
+              <a:t>3/17/2019</a:t>
             </a:fld>
             <a:endParaRPr lang="en-US"/>
           </a:p>
@@ -863,7 +863,7 @@
           <a:p>
             <a:fld id="{A6E2C317-66DB-4326-8236-4682C01F4A41}" type="datetimeFigureOut">
               <a:rPr lang="en-US" smtClean="0"/>
-              <a:t>10-Mar-19</a:t>
+              <a:t>3/17/2019</a:t>
             </a:fld>
             <a:endParaRPr lang="en-US"/>
           </a:p>
@@ -1138,7 +1138,7 @@
           <a:p>
             <a:fld id="{A6E2C317-66DB-4326-8236-4682C01F4A41}" type="datetimeFigureOut">
               <a:rPr lang="en-US" smtClean="0"/>
-              <a:t>10-Mar-19</a:t>
+              <a:t>3/17/2019</a:t>
             </a:fld>
             <a:endParaRPr lang="en-US"/>
           </a:p>
@@ -1403,7 +1403,7 @@
           <a:p>
             <a:fld id="{A6E2C317-66DB-4326-8236-4682C01F4A41}" type="datetimeFigureOut">
               <a:rPr lang="en-US" smtClean="0"/>
-              <a:t>10-Mar-19</a:t>
+              <a:t>3/17/2019</a:t>
             </a:fld>
             <a:endParaRPr lang="en-US"/>
           </a:p>
@@ -1815,7 +1815,7 @@
           <a:p>
             <a:fld id="{A6E2C317-66DB-4326-8236-4682C01F4A41}" type="datetimeFigureOut">
               <a:rPr lang="en-US" smtClean="0"/>
-              <a:t>10-Mar-19</a:t>
+              <a:t>3/17/2019</a:t>
             </a:fld>
             <a:endParaRPr lang="en-US"/>
           </a:p>
@@ -1956,7 +1956,7 @@
           <a:p>
             <a:fld id="{A6E2C317-66DB-4326-8236-4682C01F4A41}" type="datetimeFigureOut">
               <a:rPr lang="en-US" smtClean="0"/>
-              <a:t>10-Mar-19</a:t>
+              <a:t>3/17/2019</a:t>
             </a:fld>
             <a:endParaRPr lang="en-US"/>
           </a:p>
@@ -2069,7 +2069,7 @@
           <a:p>
             <a:fld id="{A6E2C317-66DB-4326-8236-4682C01F4A41}" type="datetimeFigureOut">
               <a:rPr lang="en-US" smtClean="0"/>
-              <a:t>10-Mar-19</a:t>
+              <a:t>3/17/2019</a:t>
             </a:fld>
             <a:endParaRPr lang="en-US"/>
           </a:p>
@@ -2380,7 +2380,7 @@
           <a:p>
             <a:fld id="{A6E2C317-66DB-4326-8236-4682C01F4A41}" type="datetimeFigureOut">
               <a:rPr lang="en-US" smtClean="0"/>
-              <a:t>10-Mar-19</a:t>
+              <a:t>3/17/2019</a:t>
             </a:fld>
             <a:endParaRPr lang="en-US"/>
           </a:p>
@@ -2668,7 +2668,7 @@
           <a:p>
             <a:fld id="{A6E2C317-66DB-4326-8236-4682C01F4A41}" type="datetimeFigureOut">
               <a:rPr lang="en-US" smtClean="0"/>
-              <a:t>10-Mar-19</a:t>
+              <a:t>3/17/2019</a:t>
             </a:fld>
             <a:endParaRPr lang="en-US"/>
           </a:p>
@@ -2909,7 +2909,7 @@
           <a:p>
             <a:fld id="{A6E2C317-66DB-4326-8236-4682C01F4A41}" type="datetimeFigureOut">
               <a:rPr lang="en-US" smtClean="0"/>
-              <a:t>10-Mar-19</a:t>
+              <a:t>3/17/2019</a:t>
             </a:fld>
             <a:endParaRPr lang="en-US"/>
           </a:p>
@@ -3724,6 +3724,241 @@
           </a:fontRef>
         </p:style>
       </p:cxnSp>
+      <p:cxnSp>
+        <p:nvCxnSpPr>
+          <p:cNvPr id="6" name="Straight Connector 5">
+            <a:extLst>
+              <a:ext uri="{FF2B5EF4-FFF2-40B4-BE49-F238E27FC236}">
+                <a16:creationId xmlns:a16="http://schemas.microsoft.com/office/drawing/2014/main" id="{D0D3BE4A-3399-41B8-9121-1AA0D8D9520A}"/>
+              </a:ext>
+            </a:extLst>
+          </p:cNvPr>
+          <p:cNvCxnSpPr>
+            <a:cxnSpLocks/>
+          </p:cNvCxnSpPr>
+          <p:nvPr/>
+        </p:nvCxnSpPr>
+        <p:spPr>
+          <a:xfrm>
+            <a:off x="5448988" y="2916680"/>
+            <a:ext cx="0" cy="2935480"/>
+          </a:xfrm>
+          <a:prstGeom prst="line">
+            <a:avLst/>
+          </a:prstGeom>
+          <a:ln w="6350" cap="flat" cmpd="sng" algn="ctr">
+            <a:solidFill>
+              <a:schemeClr val="dk1"/>
+            </a:solidFill>
+            <a:prstDash val="dash"/>
+            <a:round/>
+            <a:headEnd type="none" w="med" len="med"/>
+            <a:tailEnd type="none" w="med" len="med"/>
+          </a:ln>
+        </p:spPr>
+        <p:style>
+          <a:lnRef idx="0">
+            <a:scrgbClr r="0" g="0" b="0"/>
+          </a:lnRef>
+          <a:fillRef idx="0">
+            <a:scrgbClr r="0" g="0" b="0"/>
+          </a:fillRef>
+          <a:effectRef idx="0">
+            <a:scrgbClr r="0" g="0" b="0"/>
+          </a:effectRef>
+          <a:fontRef idx="minor">
+            <a:schemeClr val="tx1"/>
+          </a:fontRef>
+        </p:style>
+      </p:cxnSp>
+      <p:cxnSp>
+        <p:nvCxnSpPr>
+          <p:cNvPr id="26" name="Straight Connector 25">
+            <a:extLst>
+              <a:ext uri="{FF2B5EF4-FFF2-40B4-BE49-F238E27FC236}">
+                <a16:creationId xmlns:a16="http://schemas.microsoft.com/office/drawing/2014/main" id="{CB781BE3-1B00-4B27-B44D-339799F6255A}"/>
+              </a:ext>
+            </a:extLst>
+          </p:cNvPr>
+          <p:cNvCxnSpPr>
+            <a:cxnSpLocks/>
+          </p:cNvCxnSpPr>
+          <p:nvPr/>
+        </p:nvCxnSpPr>
+        <p:spPr>
+          <a:xfrm>
+            <a:off x="10125336" y="792480"/>
+            <a:ext cx="0" cy="2844127"/>
+          </a:xfrm>
+          <a:prstGeom prst="line">
+            <a:avLst/>
+          </a:prstGeom>
+          <a:ln w="6350" cap="flat" cmpd="sng" algn="ctr">
+            <a:solidFill>
+              <a:schemeClr val="dk1"/>
+            </a:solidFill>
+            <a:prstDash val="dash"/>
+            <a:round/>
+            <a:headEnd type="none" w="med" len="med"/>
+            <a:tailEnd type="none" w="med" len="med"/>
+          </a:ln>
+        </p:spPr>
+        <p:style>
+          <a:lnRef idx="0">
+            <a:scrgbClr r="0" g="0" b="0"/>
+          </a:lnRef>
+          <a:fillRef idx="0">
+            <a:scrgbClr r="0" g="0" b="0"/>
+          </a:fillRef>
+          <a:effectRef idx="0">
+            <a:scrgbClr r="0" g="0" b="0"/>
+          </a:effectRef>
+          <a:fontRef idx="minor">
+            <a:schemeClr val="tx1"/>
+          </a:fontRef>
+        </p:style>
+      </p:cxnSp>
+      <p:cxnSp>
+        <p:nvCxnSpPr>
+          <p:cNvPr id="35" name="Straight Connector 34">
+            <a:extLst>
+              <a:ext uri="{FF2B5EF4-FFF2-40B4-BE49-F238E27FC236}">
+                <a16:creationId xmlns:a16="http://schemas.microsoft.com/office/drawing/2014/main" id="{62A1D2D2-4A65-4362-B0CC-2B3267FD23A6}"/>
+              </a:ext>
+            </a:extLst>
+          </p:cNvPr>
+          <p:cNvCxnSpPr>
+            <a:cxnSpLocks/>
+          </p:cNvCxnSpPr>
+          <p:nvPr/>
+        </p:nvCxnSpPr>
+        <p:spPr>
+          <a:xfrm>
+            <a:off x="6522192" y="2916680"/>
+            <a:ext cx="0" cy="2935480"/>
+          </a:xfrm>
+          <a:prstGeom prst="line">
+            <a:avLst/>
+          </a:prstGeom>
+          <a:ln w="6350" cap="flat" cmpd="sng" algn="ctr">
+            <a:solidFill>
+              <a:schemeClr val="dk1"/>
+            </a:solidFill>
+            <a:prstDash val="dash"/>
+            <a:round/>
+            <a:headEnd type="none" w="med" len="med"/>
+            <a:tailEnd type="none" w="med" len="med"/>
+          </a:ln>
+        </p:spPr>
+        <p:style>
+          <a:lnRef idx="0">
+            <a:scrgbClr r="0" g="0" b="0"/>
+          </a:lnRef>
+          <a:fillRef idx="0">
+            <a:scrgbClr r="0" g="0" b="0"/>
+          </a:fillRef>
+          <a:effectRef idx="0">
+            <a:scrgbClr r="0" g="0" b="0"/>
+          </a:effectRef>
+          <a:fontRef idx="minor">
+            <a:schemeClr val="tx1"/>
+          </a:fontRef>
+        </p:style>
+      </p:cxnSp>
+      <p:cxnSp>
+        <p:nvCxnSpPr>
+          <p:cNvPr id="36" name="Straight Connector 35">
+            <a:extLst>
+              <a:ext uri="{FF2B5EF4-FFF2-40B4-BE49-F238E27FC236}">
+                <a16:creationId xmlns:a16="http://schemas.microsoft.com/office/drawing/2014/main" id="{7F1FD5EB-6C1E-4050-B438-622AC1B1499C}"/>
+              </a:ext>
+            </a:extLst>
+          </p:cNvPr>
+          <p:cNvCxnSpPr>
+            <a:cxnSpLocks/>
+          </p:cNvCxnSpPr>
+          <p:nvPr/>
+        </p:nvCxnSpPr>
+        <p:spPr>
+          <a:xfrm>
+            <a:off x="6374651" y="5750998"/>
+            <a:ext cx="699296" cy="0"/>
+          </a:xfrm>
+          <a:prstGeom prst="line">
+            <a:avLst/>
+          </a:prstGeom>
+          <a:ln w="6350" cap="flat" cmpd="sng" algn="ctr">
+            <a:solidFill>
+              <a:schemeClr val="dk1"/>
+            </a:solidFill>
+            <a:prstDash val="dash"/>
+            <a:round/>
+            <a:headEnd type="none" w="med" len="med"/>
+            <a:tailEnd type="none" w="med" len="med"/>
+          </a:ln>
+        </p:spPr>
+        <p:style>
+          <a:lnRef idx="0">
+            <a:scrgbClr r="0" g="0" b="0"/>
+          </a:lnRef>
+          <a:fillRef idx="0">
+            <a:scrgbClr r="0" g="0" b="0"/>
+          </a:fillRef>
+          <a:effectRef idx="0">
+            <a:scrgbClr r="0" g="0" b="0"/>
+          </a:effectRef>
+          <a:fontRef idx="minor">
+            <a:schemeClr val="tx1"/>
+          </a:fontRef>
+        </p:style>
+      </p:cxnSp>
+      <p:cxnSp>
+        <p:nvCxnSpPr>
+          <p:cNvPr id="39" name="Straight Connector 38">
+            <a:extLst>
+              <a:ext uri="{FF2B5EF4-FFF2-40B4-BE49-F238E27FC236}">
+                <a16:creationId xmlns:a16="http://schemas.microsoft.com/office/drawing/2014/main" id="{ACBD9355-D2D2-49CD-A60C-C69AD4433D12}"/>
+              </a:ext>
+            </a:extLst>
+          </p:cNvPr>
+          <p:cNvCxnSpPr>
+            <a:cxnSpLocks/>
+          </p:cNvCxnSpPr>
+          <p:nvPr/>
+        </p:nvCxnSpPr>
+        <p:spPr>
+          <a:xfrm>
+            <a:off x="6347630" y="3215151"/>
+            <a:ext cx="699296" cy="0"/>
+          </a:xfrm>
+          <a:prstGeom prst="line">
+            <a:avLst/>
+          </a:prstGeom>
+          <a:ln w="6350" cap="flat" cmpd="sng" algn="ctr">
+            <a:solidFill>
+              <a:schemeClr val="dk1"/>
+            </a:solidFill>
+            <a:prstDash val="dash"/>
+            <a:round/>
+            <a:headEnd type="none" w="med" len="med"/>
+            <a:tailEnd type="none" w="med" len="med"/>
+          </a:ln>
+        </p:spPr>
+        <p:style>
+          <a:lnRef idx="0">
+            <a:scrgbClr r="0" g="0" b="0"/>
+          </a:lnRef>
+          <a:fillRef idx="0">
+            <a:scrgbClr r="0" g="0" b="0"/>
+          </a:fillRef>
+          <a:effectRef idx="0">
+            <a:scrgbClr r="0" g="0" b="0"/>
+          </a:effectRef>
+          <a:fontRef idx="minor">
+            <a:schemeClr val="tx1"/>
+          </a:fontRef>
+        </p:style>
+      </p:cxnSp>
     </p:spTree>
     <p:extLst>
       <p:ext uri="{BB962C8B-B14F-4D97-AF65-F5344CB8AC3E}">

</xml_diff>